<commit_message>
DeveloperGuide.adoc: Updated implementation section for Manage command
</commit_message>
<xml_diff>
--- a/docs/diagrams/Command_Switch_SequenceDiagram.pptx
+++ b/docs/diagrams/Command_Switch_SequenceDiagram.pptx
@@ -473,6 +473,90 @@
     </a:lvl9pPr>
   </p:notesStyle>
 </p:notesMaster>
+</file>
+
+<file path=ppt/notesSlides/notesSlide1.xml><?xml version="1.0" encoding="utf-8"?>
+<p:notes xmlns:a="http://schemas.openxmlformats.org/drawingml/2006/main" xmlns:r="http://schemas.openxmlformats.org/officeDocument/2006/relationships" xmlns:p="http://schemas.openxmlformats.org/presentationml/2006/main">
+  <p:cSld>
+    <p:spTree>
+      <p:nvGrpSpPr>
+        <p:cNvPr id="1" name=""/>
+        <p:cNvGrpSpPr/>
+        <p:nvPr/>
+      </p:nvGrpSpPr>
+      <p:grpSpPr>
+        <a:xfrm>
+          <a:off x="0" y="0"/>
+          <a:ext cx="0" cy="0"/>
+          <a:chOff x="0" y="0"/>
+          <a:chExt cx="0" cy="0"/>
+        </a:xfrm>
+      </p:grpSpPr>
+      <p:sp>
+        <p:nvSpPr>
+          <p:cNvPr id="2" name="Slide Image Placeholder 1"/>
+          <p:cNvSpPr>
+            <a:spLocks noGrp="1" noRot="1" noChangeAspect="1"/>
+          </p:cNvSpPr>
+          <p:nvPr>
+            <p:ph type="sldImg"/>
+          </p:nvPr>
+        </p:nvSpPr>
+        <p:spPr/>
+      </p:sp>
+      <p:sp>
+        <p:nvSpPr>
+          <p:cNvPr id="3" name="Notes Placeholder 2"/>
+          <p:cNvSpPr>
+            <a:spLocks noGrp="1"/>
+          </p:cNvSpPr>
+          <p:nvPr>
+            <p:ph type="body" idx="1"/>
+          </p:nvPr>
+        </p:nvSpPr>
+        <p:spPr/>
+        <p:txBody>
+          <a:bodyPr/>
+          <a:lstStyle/>
+          <a:p>
+            <a:endParaRPr lang="en-SG" dirty="0"/>
+          </a:p>
+        </p:txBody>
+      </p:sp>
+      <p:sp>
+        <p:nvSpPr>
+          <p:cNvPr id="4" name="Slide Number Placeholder 3"/>
+          <p:cNvSpPr>
+            <a:spLocks noGrp="1"/>
+          </p:cNvSpPr>
+          <p:nvPr>
+            <p:ph type="sldNum" sz="quarter" idx="5"/>
+          </p:nvPr>
+        </p:nvSpPr>
+        <p:spPr/>
+        <p:txBody>
+          <a:bodyPr/>
+          <a:lstStyle/>
+          <a:p>
+            <a:fld id="{5A7AB025-77E3-4BD1-A2FD-B3183DBA47A3}" type="slidenum">
+              <a:rPr lang="en-US" smtClean="0"/>
+              <a:t>1</a:t>
+            </a:fld>
+            <a:endParaRPr lang="en-US"/>
+          </a:p>
+        </p:txBody>
+      </p:sp>
+    </p:spTree>
+    <p:extLst>
+      <p:ext uri="{BB962C8B-B14F-4D97-AF65-F5344CB8AC3E}">
+        <p14:creationId xmlns:p14="http://schemas.microsoft.com/office/powerpoint/2010/main" val="542975546"/>
+      </p:ext>
+    </p:extLst>
+  </p:cSld>
+  <p:clrMapOvr>
+    <a:masterClrMapping/>
+  </p:clrMapOvr>
+</p:notes>
 </file>
 
 <file path=ppt/slideLayouts/slideLayout1.xml><?xml version="1.0" encoding="utf-8"?>
@@ -3520,7 +3604,7 @@
         <p:spPr>
           <a:xfrm>
             <a:off x="7028025" y="2415140"/>
-            <a:ext cx="0" cy="2104345"/>
+            <a:ext cx="16180" cy="1543399"/>
           </a:xfrm>
           <a:prstGeom prst="line">
             <a:avLst/>
@@ -5577,6 +5661,45 @@
           </a:fontRef>
         </p:style>
       </p:cxnSp>
+      <p:sp>
+        <p:nvSpPr>
+          <p:cNvPr id="54" name="TextBox 53">
+            <a:extLst>
+              <a:ext uri="{FF2B5EF4-FFF2-40B4-BE49-F238E27FC236}">
+                <a16:creationId xmlns:a16="http://schemas.microsoft.com/office/drawing/2014/main" id="{5E30A65B-6054-485B-9CED-FD21D466036B}"/>
+              </a:ext>
+            </a:extLst>
+          </p:cNvPr>
+          <p:cNvSpPr txBox="1"/>
+          <p:nvPr/>
+        </p:nvSpPr>
+        <p:spPr>
+          <a:xfrm>
+            <a:off x="6915003" y="3947777"/>
+            <a:ext cx="258404" cy="261610"/>
+          </a:xfrm>
+          <a:prstGeom prst="rect">
+            <a:avLst/>
+          </a:prstGeom>
+          <a:noFill/>
+        </p:spPr>
+        <p:txBody>
+          <a:bodyPr wrap="none" rtlCol="0">
+            <a:spAutoFit/>
+          </a:bodyPr>
+          <a:lstStyle/>
+          <a:p>
+            <a:r>
+              <a:rPr lang="en-SG" sz="1100" dirty="0">
+                <a:solidFill>
+                  <a:srgbClr val="002060"/>
+                </a:solidFill>
+              </a:rPr>
+              <a:t>X</a:t>
+            </a:r>
+          </a:p>
+        </p:txBody>
+      </p:sp>
     </p:spTree>
     <p:extLst>
       <p:ext uri="{BB962C8B-B14F-4D97-AF65-F5344CB8AC3E}">

</xml_diff>

<commit_message>
DeveloperGuide.adoc: Fixed switch SD
</commit_message>
<xml_diff>
--- a/docs/diagrams/Command_Switch_SequenceDiagram.pptx
+++ b/docs/diagrams/Command_Switch_SequenceDiagram.pptx
@@ -208,7 +208,7 @@
           <a:p>
             <a:fld id="{F5CC4B3F-88C1-4FFA-B1B6-F41C21DC6924}" type="datetimeFigureOut">
               <a:rPr lang="en-US" smtClean="0"/>
-              <a:t>10/16/2018</a:t>
+              <a:t>10/30/2018</a:t>
             </a:fld>
             <a:endParaRPr lang="en-US"/>
           </a:p>
@@ -738,7 +738,7 @@
           <a:p>
             <a:fld id="{78C97017-6FC3-485B-9764-EAC9E56C1D49}" type="datetimeFigureOut">
               <a:rPr lang="en-US" smtClean="0"/>
-              <a:t>10/16/2018</a:t>
+              <a:t>10/30/2018</a:t>
             </a:fld>
             <a:endParaRPr lang="en-US"/>
           </a:p>
@@ -906,7 +906,7 @@
           <a:p>
             <a:fld id="{78C97017-6FC3-485B-9764-EAC9E56C1D49}" type="datetimeFigureOut">
               <a:rPr lang="en-US" smtClean="0"/>
-              <a:t>10/16/2018</a:t>
+              <a:t>10/30/2018</a:t>
             </a:fld>
             <a:endParaRPr lang="en-US"/>
           </a:p>
@@ -1084,7 +1084,7 @@
           <a:p>
             <a:fld id="{78C97017-6FC3-485B-9764-EAC9E56C1D49}" type="datetimeFigureOut">
               <a:rPr lang="en-US" smtClean="0"/>
-              <a:t>10/16/2018</a:t>
+              <a:t>10/30/2018</a:t>
             </a:fld>
             <a:endParaRPr lang="en-US"/>
           </a:p>
@@ -1252,7 +1252,7 @@
           <a:p>
             <a:fld id="{78C97017-6FC3-485B-9764-EAC9E56C1D49}" type="datetimeFigureOut">
               <a:rPr lang="en-US" smtClean="0"/>
-              <a:t>10/16/2018</a:t>
+              <a:t>10/30/2018</a:t>
             </a:fld>
             <a:endParaRPr lang="en-US"/>
           </a:p>
@@ -1497,7 +1497,7 @@
           <a:p>
             <a:fld id="{78C97017-6FC3-485B-9764-EAC9E56C1D49}" type="datetimeFigureOut">
               <a:rPr lang="en-US" smtClean="0"/>
-              <a:t>10/16/2018</a:t>
+              <a:t>10/30/2018</a:t>
             </a:fld>
             <a:endParaRPr lang="en-US"/>
           </a:p>
@@ -1782,7 +1782,7 @@
           <a:p>
             <a:fld id="{78C97017-6FC3-485B-9764-EAC9E56C1D49}" type="datetimeFigureOut">
               <a:rPr lang="en-US" smtClean="0"/>
-              <a:t>10/16/2018</a:t>
+              <a:t>10/30/2018</a:t>
             </a:fld>
             <a:endParaRPr lang="en-US"/>
           </a:p>
@@ -2201,7 +2201,7 @@
           <a:p>
             <a:fld id="{78C97017-6FC3-485B-9764-EAC9E56C1D49}" type="datetimeFigureOut">
               <a:rPr lang="en-US" smtClean="0"/>
-              <a:t>10/16/2018</a:t>
+              <a:t>10/30/2018</a:t>
             </a:fld>
             <a:endParaRPr lang="en-US"/>
           </a:p>
@@ -2318,7 +2318,7 @@
           <a:p>
             <a:fld id="{78C97017-6FC3-485B-9764-EAC9E56C1D49}" type="datetimeFigureOut">
               <a:rPr lang="en-US" smtClean="0"/>
-              <a:t>10/16/2018</a:t>
+              <a:t>10/30/2018</a:t>
             </a:fld>
             <a:endParaRPr lang="en-US"/>
           </a:p>
@@ -2413,7 +2413,7 @@
           <a:p>
             <a:fld id="{78C97017-6FC3-485B-9764-EAC9E56C1D49}" type="datetimeFigureOut">
               <a:rPr lang="en-US" smtClean="0"/>
-              <a:t>10/16/2018</a:t>
+              <a:t>10/30/2018</a:t>
             </a:fld>
             <a:endParaRPr lang="en-US"/>
           </a:p>
@@ -2688,7 +2688,7 @@
           <a:p>
             <a:fld id="{78C97017-6FC3-485B-9764-EAC9E56C1D49}" type="datetimeFigureOut">
               <a:rPr lang="en-US" smtClean="0"/>
-              <a:t>10/16/2018</a:t>
+              <a:t>10/30/2018</a:t>
             </a:fld>
             <a:endParaRPr lang="en-US"/>
           </a:p>
@@ -2940,7 +2940,7 @@
           <a:p>
             <a:fld id="{78C97017-6FC3-485B-9764-EAC9E56C1D49}" type="datetimeFigureOut">
               <a:rPr lang="en-US" smtClean="0"/>
-              <a:t>10/16/2018</a:t>
+              <a:t>10/30/2018</a:t>
             </a:fld>
             <a:endParaRPr lang="en-US"/>
           </a:p>
@@ -3151,7 +3151,7 @@
           <a:p>
             <a:fld id="{78C97017-6FC3-485B-9764-EAC9E56C1D49}" type="datetimeFigureOut">
               <a:rPr lang="en-US" smtClean="0"/>
-              <a:t>10/16/2018</a:t>
+              <a:t>10/30/2018</a:t>
             </a:fld>
             <a:endParaRPr lang="en-US"/>
           </a:p>
@@ -3534,8 +3534,8 @@
         </p:nvSpPr>
         <p:spPr>
           <a:xfrm>
-            <a:off x="-949244" y="736600"/>
-            <a:ext cx="8970549" cy="4343400"/>
+            <a:off x="-2499512" y="709489"/>
+            <a:ext cx="9931522" cy="5151897"/>
           </a:xfrm>
           <a:prstGeom prst="roundRect">
             <a:avLst>
@@ -3598,13 +3598,14 @@
           </p:cNvPr>
           <p:cNvCxnSpPr>
             <a:cxnSpLocks/>
+            <a:endCxn id="54" idx="0"/>
           </p:cNvCxnSpPr>
           <p:nvPr/>
         </p:nvCxnSpPr>
         <p:spPr>
           <a:xfrm>
-            <a:off x="7028025" y="2415140"/>
-            <a:ext cx="16180" cy="1543399"/>
+            <a:off x="6530932" y="2887600"/>
+            <a:ext cx="27266" cy="2108590"/>
           </a:xfrm>
           <a:prstGeom prst="line">
             <a:avLst/>
@@ -3640,8 +3641,8 @@
         </p:nvSpPr>
         <p:spPr>
           <a:xfrm>
-            <a:off x="8610602" y="685800"/>
-            <a:ext cx="2993478" cy="4400926"/>
+            <a:off x="7674522" y="722290"/>
+            <a:ext cx="2993478" cy="5151897"/>
           </a:xfrm>
           <a:prstGeom prst="roundRect">
             <a:avLst>
@@ -3701,7 +3702,7 @@
         </p:nvSpPr>
         <p:spPr>
           <a:xfrm>
-            <a:off x="-533910" y="1117528"/>
+            <a:off x="-2151736" y="1117528"/>
             <a:ext cx="1455629" cy="346760"/>
           </a:xfrm>
           <a:prstGeom prst="rect">
@@ -3762,8 +3763,8 @@
         </p:nvCxnSpPr>
         <p:spPr>
           <a:xfrm>
-            <a:off x="193903" y="1481201"/>
-            <a:ext cx="0" cy="3481399"/>
+            <a:off x="-1423923" y="1481201"/>
+            <a:ext cx="1" cy="3928999"/>
           </a:xfrm>
           <a:prstGeom prst="line">
             <a:avLst/>
@@ -3799,8 +3800,8 @@
         </p:nvSpPr>
         <p:spPr>
           <a:xfrm>
-            <a:off x="121895" y="1831895"/>
-            <a:ext cx="152400" cy="2932689"/>
+            <a:off x="-1495932" y="1831896"/>
+            <a:ext cx="159417" cy="3044904"/>
           </a:xfrm>
           <a:prstGeom prst="rect">
             <a:avLst/>
@@ -3846,7 +3847,7 @@
         </p:nvSpPr>
         <p:spPr>
           <a:xfrm>
-            <a:off x="2020132" y="996604"/>
+            <a:off x="402306" y="996604"/>
             <a:ext cx="1219200" cy="467684"/>
           </a:xfrm>
           <a:prstGeom prst="rect">
@@ -3918,8 +3919,8 @@
         </p:nvCxnSpPr>
         <p:spPr>
           <a:xfrm>
-            <a:off x="2633531" y="1481199"/>
-            <a:ext cx="0" cy="1482984"/>
+            <a:off x="1015705" y="1481199"/>
+            <a:ext cx="39117" cy="2101757"/>
           </a:xfrm>
           <a:prstGeom prst="line">
             <a:avLst/>
@@ -3955,8 +3956,8 @@
         </p:nvSpPr>
         <p:spPr>
           <a:xfrm>
-            <a:off x="2561524" y="1939392"/>
-            <a:ext cx="154408" cy="767790"/>
+            <a:off x="914401" y="1939392"/>
+            <a:ext cx="229992" cy="1447223"/>
           </a:xfrm>
           <a:prstGeom prst="rect">
             <a:avLst/>
@@ -4000,14 +4001,13 @@
           <p:cNvCxnSpPr>
             <a:cxnSpLocks/>
             <a:stCxn id="21" idx="0"/>
-            <a:endCxn id="4" idx="0"/>
           </p:cNvCxnSpPr>
           <p:nvPr/>
         </p:nvCxnSpPr>
         <p:spPr>
-          <a:xfrm flipH="1">
-            <a:off x="4445984" y="2187215"/>
-            <a:ext cx="1604" cy="2644578"/>
+          <a:xfrm>
+            <a:off x="3910453" y="2187214"/>
+            <a:ext cx="0" cy="1151462"/>
           </a:xfrm>
           <a:prstGeom prst="line">
             <a:avLst/>
@@ -4043,8 +4043,8 @@
         </p:nvSpPr>
         <p:spPr>
           <a:xfrm>
-            <a:off x="4370393" y="2187215"/>
-            <a:ext cx="154393" cy="766746"/>
+            <a:off x="3830595" y="2187214"/>
+            <a:ext cx="159716" cy="1005969"/>
           </a:xfrm>
           <a:prstGeom prst="rect">
             <a:avLst/>
@@ -4090,7 +4090,7 @@
         </p:nvCxnSpPr>
         <p:spPr>
           <a:xfrm>
-            <a:off x="-997955" y="1835581"/>
+            <a:off x="-2615781" y="1835581"/>
             <a:ext cx="1119851" cy="0"/>
           </a:xfrm>
           <a:prstGeom prst="straightConnector1">
@@ -4126,7 +4126,7 @@
         </p:nvSpPr>
         <p:spPr>
           <a:xfrm>
-            <a:off x="-1430174" y="1564182"/>
+            <a:off x="-3048000" y="1564182"/>
             <a:ext cx="1476065" cy="215444"/>
           </a:xfrm>
           <a:prstGeom prst="rect">
@@ -4157,13 +4157,14 @@
           <p:cNvPr id="28" name="Straight Arrow Connector 27"/>
           <p:cNvCxnSpPr>
             <a:cxnSpLocks/>
+            <a:endCxn id="19" idx="1"/>
           </p:cNvCxnSpPr>
           <p:nvPr/>
         </p:nvCxnSpPr>
         <p:spPr>
           <a:xfrm>
-            <a:off x="2718918" y="2085925"/>
-            <a:ext cx="935911" cy="1612"/>
+            <a:off x="1096096" y="2056939"/>
+            <a:ext cx="2040652" cy="2630"/>
           </a:xfrm>
           <a:prstGeom prst="straightConnector1">
             <a:avLst/>
@@ -4198,7 +4199,7 @@
         </p:nvSpPr>
         <p:spPr>
           <a:xfrm>
-            <a:off x="1826367" y="3057653"/>
+            <a:off x="1872503" y="3641605"/>
             <a:ext cx="855809" cy="215444"/>
           </a:xfrm>
           <a:prstGeom prst="rect">
@@ -4240,8 +4241,8 @@
         </p:nvCxnSpPr>
         <p:spPr>
           <a:xfrm>
-            <a:off x="4538773" y="3671532"/>
-            <a:ext cx="2383752" cy="8623"/>
+            <a:off x="3939942" y="3102897"/>
+            <a:ext cx="2560230" cy="0"/>
           </a:xfrm>
           <a:prstGeom prst="straightConnector1">
             <a:avLst/>
@@ -4280,8 +4281,8 @@
         </p:nvCxnSpPr>
         <p:spPr>
           <a:xfrm>
-            <a:off x="274297" y="2707182"/>
-            <a:ext cx="2348067" cy="0"/>
+            <a:off x="1144395" y="3193183"/>
+            <a:ext cx="2686197" cy="7217"/>
           </a:xfrm>
           <a:prstGeom prst="straightConnector1">
             <a:avLst/>
@@ -4318,7 +4319,7 @@
         </p:nvCxnSpPr>
         <p:spPr>
           <a:xfrm>
-            <a:off x="-1036056" y="4764582"/>
+            <a:off x="-2691982" y="4876800"/>
             <a:ext cx="1196051" cy="0"/>
           </a:xfrm>
           <a:prstGeom prst="straightConnector1">
@@ -4350,60 +4351,13 @@
       </p:cxnSp>
       <p:sp>
         <p:nvSpPr>
-          <p:cNvPr id="65" name="Rectangle 64"/>
-          <p:cNvSpPr/>
-          <p:nvPr/>
-        </p:nvSpPr>
-        <p:spPr>
-          <a:xfrm>
-            <a:off x="4370390" y="3304897"/>
-            <a:ext cx="161322" cy="1307285"/>
-          </a:xfrm>
-          <a:prstGeom prst="rect">
-            <a:avLst/>
-          </a:prstGeom>
-          <a:solidFill>
-            <a:srgbClr val="0070C0"/>
-          </a:solidFill>
-          <a:ln>
-            <a:solidFill>
-              <a:srgbClr val="0070C0"/>
-            </a:solidFill>
-          </a:ln>
-          <a:effectLst/>
-        </p:spPr>
-        <p:style>
-          <a:lnRef idx="1">
-            <a:schemeClr val="accent3"/>
-          </a:lnRef>
-          <a:fillRef idx="2">
-            <a:schemeClr val="accent3"/>
-          </a:fillRef>
-          <a:effectRef idx="1">
-            <a:schemeClr val="accent3"/>
-          </a:effectRef>
-          <a:fontRef idx="minor">
-            <a:schemeClr val="dk1"/>
-          </a:fontRef>
-        </p:style>
-        <p:txBody>
-          <a:bodyPr rtlCol="0" anchor="ctr"/>
-          <a:lstStyle/>
-          <a:p>
-            <a:pPr algn="ctr"/>
-            <a:endParaRPr lang="en-SG" sz="1400"/>
-          </a:p>
-        </p:txBody>
-      </p:sp>
-      <p:sp>
-        <p:nvSpPr>
           <p:cNvPr id="80" name="TextBox 79"/>
           <p:cNvSpPr txBox="1"/>
           <p:nvPr/>
         </p:nvSpPr>
         <p:spPr>
           <a:xfrm>
-            <a:off x="340538" y="1690257"/>
+            <a:off x="-1277288" y="1690257"/>
             <a:ext cx="2207356" cy="215444"/>
           </a:xfrm>
           <a:prstGeom prst="rect">
@@ -4441,14 +4395,14 @@
       </p:sp>
       <p:sp>
         <p:nvSpPr>
-          <p:cNvPr id="82" name="TextBox 81"/>
+          <p:cNvPr id="83" name="TextBox 82"/>
           <p:cNvSpPr txBox="1"/>
           <p:nvPr/>
         </p:nvSpPr>
         <p:spPr>
           <a:xfrm>
-            <a:off x="1855699" y="4364658"/>
-            <a:ext cx="621216" cy="215444"/>
+            <a:off x="-2572622" y="4605400"/>
+            <a:ext cx="762000" cy="215444"/>
           </a:xfrm>
           <a:prstGeom prst="rect">
             <a:avLst/>
@@ -4481,53 +4435,13 @@
       </p:sp>
       <p:sp>
         <p:nvSpPr>
-          <p:cNvPr id="83" name="TextBox 82"/>
-          <p:cNvSpPr txBox="1"/>
-          <p:nvPr/>
-        </p:nvSpPr>
-        <p:spPr>
-          <a:xfrm>
-            <a:off x="-975276" y="4472380"/>
-            <a:ext cx="762000" cy="215444"/>
-          </a:xfrm>
-          <a:prstGeom prst="rect">
-            <a:avLst/>
-          </a:prstGeom>
-          <a:noFill/>
-        </p:spPr>
-        <p:txBody>
-          <a:bodyPr wrap="square" lIns="0" tIns="0" rIns="0" bIns="0" rtlCol="0">
-            <a:spAutoFit/>
-          </a:bodyPr>
-          <a:lstStyle>
-            <a:defPPr>
-              <a:defRPr lang="en-US"/>
-            </a:defPPr>
-            <a:lvl1pPr algn="r">
-              <a:defRPr sz="1400">
-                <a:solidFill>
-                  <a:srgbClr val="0070C0"/>
-                </a:solidFill>
-              </a:defRPr>
-            </a:lvl1pPr>
-          </a:lstStyle>
-          <a:p>
-            <a:r>
-              <a:rPr lang="en-US" dirty="0"/>
-              <a:t>result</a:t>
-            </a:r>
-          </a:p>
-        </p:txBody>
-      </p:sp>
-      <p:sp>
-        <p:nvSpPr>
           <p:cNvPr id="40" name="Rectangle 62"/>
           <p:cNvSpPr/>
           <p:nvPr/>
         </p:nvSpPr>
         <p:spPr>
           <a:xfrm>
-            <a:off x="8701378" y="2318115"/>
+            <a:off x="7924800" y="3077577"/>
             <a:ext cx="841636" cy="300180"/>
           </a:xfrm>
           <a:prstGeom prst="rect">
@@ -4587,9 +4501,9 @@
           <p:nvPr/>
         </p:nvCxnSpPr>
         <p:spPr>
-          <a:xfrm flipH="1">
-            <a:off x="9122195" y="2645409"/>
-            <a:ext cx="15522" cy="1247468"/>
+          <a:xfrm>
+            <a:off x="8361139" y="3363889"/>
+            <a:ext cx="10102" cy="1741511"/>
           </a:xfrm>
           <a:prstGeom prst="line">
             <a:avLst/>
@@ -4622,14 +4536,13 @@
           <p:cNvPr id="50" name="Straight Arrow Connector 49"/>
           <p:cNvCxnSpPr>
             <a:cxnSpLocks/>
-            <a:endCxn id="51" idx="1"/>
           </p:cNvCxnSpPr>
           <p:nvPr/>
         </p:nvCxnSpPr>
         <p:spPr>
-          <a:xfrm>
-            <a:off x="4478725" y="2452478"/>
-            <a:ext cx="1711100" cy="0"/>
+          <a:xfrm flipV="1">
+            <a:off x="1143000" y="2555095"/>
+            <a:ext cx="2704661" cy="14528"/>
           </a:xfrm>
           <a:prstGeom prst="straightConnector1">
             <a:avLst/>
@@ -4664,7 +4577,7 @@
         </p:nvSpPr>
         <p:spPr>
           <a:xfrm>
-            <a:off x="4316782" y="4831793"/>
+            <a:off x="3782399" y="3236135"/>
             <a:ext cx="258404" cy="261610"/>
           </a:xfrm>
           <a:prstGeom prst="rect">
@@ -4697,7 +4610,7 @@
         </p:nvSpPr>
         <p:spPr>
           <a:xfrm>
-            <a:off x="3624692" y="1751090"/>
+            <a:off x="3136748" y="1828800"/>
             <a:ext cx="1570026" cy="461538"/>
           </a:xfrm>
           <a:prstGeom prst="rect">
@@ -4774,9 +4687,9 @@
           <p:nvPr/>
         </p:nvCxnSpPr>
         <p:spPr>
-          <a:xfrm>
-            <a:off x="349890" y="3366569"/>
-            <a:ext cx="3835943" cy="14401"/>
+          <a:xfrm flipV="1">
+            <a:off x="-1351915" y="3890386"/>
+            <a:ext cx="7812481" cy="11029"/>
           </a:xfrm>
           <a:prstGeom prst="straightConnector1">
             <a:avLst/>
@@ -4819,7 +4732,7 @@
         </p:nvCxnSpPr>
         <p:spPr>
           <a:xfrm>
-            <a:off x="291191" y="1937502"/>
+            <a:off x="-1326635" y="1937502"/>
             <a:ext cx="2256705" cy="1"/>
           </a:xfrm>
           <a:prstGeom prst="straightConnector1">
@@ -4863,8 +4776,8 @@
         </p:nvCxnSpPr>
         <p:spPr>
           <a:xfrm>
-            <a:off x="274944" y="4610044"/>
-            <a:ext cx="3831517" cy="0"/>
+            <a:off x="-1332146" y="4754536"/>
+            <a:ext cx="7803578" cy="46390"/>
           </a:xfrm>
           <a:prstGeom prst="straightConnector1">
             <a:avLst/>
@@ -4893,9 +4806,340 @@
           </a:fontRef>
         </p:style>
       </p:cxnSp>
+      <p:sp>
+        <p:nvSpPr>
+          <p:cNvPr id="47" name="TextBox 46">
+            <a:extLst>
+              <a:ext uri="{FF2B5EF4-FFF2-40B4-BE49-F238E27FC236}">
+                <a16:creationId xmlns:a16="http://schemas.microsoft.com/office/drawing/2014/main" id="{90E1B110-D951-4D18-87D6-15DCDA58B69B}"/>
+              </a:ext>
+            </a:extLst>
+          </p:cNvPr>
+          <p:cNvSpPr txBox="1"/>
+          <p:nvPr/>
+        </p:nvSpPr>
+        <p:spPr>
+          <a:xfrm>
+            <a:off x="1105688" y="1761527"/>
+            <a:ext cx="1924686" cy="215444"/>
+          </a:xfrm>
+          <a:prstGeom prst="rect">
+            <a:avLst/>
+          </a:prstGeom>
+          <a:noFill/>
+        </p:spPr>
+        <p:txBody>
+          <a:bodyPr wrap="square" lIns="0" tIns="0" rIns="0" bIns="0" rtlCol="0">
+            <a:spAutoFit/>
+          </a:bodyPr>
+          <a:lstStyle>
+            <a:defPPr>
+              <a:defRPr lang="en-US"/>
+            </a:defPPr>
+            <a:lvl1pPr algn="r">
+              <a:defRPr sz="1400">
+                <a:solidFill>
+                  <a:srgbClr val="0070C0"/>
+                </a:solidFill>
+              </a:defRPr>
+            </a:lvl1pPr>
+          </a:lstStyle>
+          <a:p>
+            <a:r>
+              <a:rPr lang="en-US" dirty="0" err="1"/>
+              <a:t>SwitchCommandParser</a:t>
+            </a:r>
+            <a:r>
+              <a:rPr lang="en-US" dirty="0"/>
+              <a:t>()</a:t>
+            </a:r>
+          </a:p>
+        </p:txBody>
+      </p:sp>
+      <p:sp>
+        <p:nvSpPr>
+          <p:cNvPr id="51" name="Rectangle 62">
+            <a:extLst>
+              <a:ext uri="{FF2B5EF4-FFF2-40B4-BE49-F238E27FC236}">
+                <a16:creationId xmlns:a16="http://schemas.microsoft.com/office/drawing/2014/main" id="{5EC97B0A-7289-495B-8356-E4A4DEB293EF}"/>
+              </a:ext>
+            </a:extLst>
+          </p:cNvPr>
+          <p:cNvSpPr/>
+          <p:nvPr/>
+        </p:nvSpPr>
+        <p:spPr>
+          <a:xfrm>
+            <a:off x="5661972" y="2508122"/>
+            <a:ext cx="1635602" cy="461538"/>
+          </a:xfrm>
+          <a:prstGeom prst="rect">
+            <a:avLst/>
+          </a:prstGeom>
+          <a:solidFill>
+            <a:srgbClr val="0070C0"/>
+          </a:solidFill>
+          <a:ln w="19050">
+            <a:solidFill>
+              <a:srgbClr val="0070C0"/>
+            </a:solidFill>
+          </a:ln>
+          <a:effectLst/>
+        </p:spPr>
+        <p:style>
+          <a:lnRef idx="1">
+            <a:schemeClr val="accent2"/>
+          </a:lnRef>
+          <a:fillRef idx="2">
+            <a:schemeClr val="accent2"/>
+          </a:fillRef>
+          <a:effectRef idx="1">
+            <a:schemeClr val="accent2"/>
+          </a:effectRef>
+          <a:fontRef idx="minor">
+            <a:schemeClr val="dk1"/>
+          </a:fontRef>
+        </p:style>
+        <p:txBody>
+          <a:bodyPr rtlCol="0" anchor="ctr"/>
+          <a:lstStyle/>
+          <a:p>
+            <a:pPr algn="ctr"/>
+            <a:r>
+              <a:rPr lang="en-US" sz="1600" dirty="0">
+                <a:solidFill>
+                  <a:schemeClr val="bg1"/>
+                </a:solidFill>
+              </a:rPr>
+              <a:t>:</a:t>
+            </a:r>
+            <a:r>
+              <a:rPr lang="en-US" sz="1600" dirty="0" err="1">
+                <a:solidFill>
+                  <a:schemeClr val="bg1"/>
+                </a:solidFill>
+              </a:rPr>
+              <a:t>SwitchCommand</a:t>
+            </a:r>
+            <a:endParaRPr lang="en-SG" sz="1600" dirty="0">
+              <a:solidFill>
+                <a:schemeClr val="bg1"/>
+              </a:solidFill>
+            </a:endParaRPr>
+          </a:p>
+        </p:txBody>
+      </p:sp>
+      <p:sp>
+        <p:nvSpPr>
+          <p:cNvPr id="57" name="TextBox 56">
+            <a:extLst>
+              <a:ext uri="{FF2B5EF4-FFF2-40B4-BE49-F238E27FC236}">
+                <a16:creationId xmlns:a16="http://schemas.microsoft.com/office/drawing/2014/main" id="{9B128A04-D620-4490-80E7-830DB8A94CF1}"/>
+              </a:ext>
+            </a:extLst>
+          </p:cNvPr>
+          <p:cNvSpPr txBox="1"/>
+          <p:nvPr/>
+        </p:nvSpPr>
+        <p:spPr>
+          <a:xfrm>
+            <a:off x="995815" y="2313664"/>
+            <a:ext cx="1756536" cy="215444"/>
+          </a:xfrm>
+          <a:prstGeom prst="rect">
+            <a:avLst/>
+          </a:prstGeom>
+          <a:noFill/>
+        </p:spPr>
+        <p:txBody>
+          <a:bodyPr wrap="square" lIns="0" tIns="0" rIns="0" bIns="0" rtlCol="0">
+            <a:spAutoFit/>
+          </a:bodyPr>
+          <a:lstStyle>
+            <a:defPPr>
+              <a:defRPr lang="en-US"/>
+            </a:defPPr>
+            <a:lvl1pPr algn="r">
+              <a:defRPr sz="1400">
+                <a:solidFill>
+                  <a:srgbClr val="0070C0"/>
+                </a:solidFill>
+              </a:defRPr>
+            </a:lvl1pPr>
+          </a:lstStyle>
+          <a:p>
+            <a:r>
+              <a:rPr lang="en-US" dirty="0"/>
+              <a:t>parse(“e”)</a:t>
+            </a:r>
+          </a:p>
+        </p:txBody>
+      </p:sp>
+      <p:sp>
+        <p:nvSpPr>
+          <p:cNvPr id="59" name="Rectangle 58">
+            <a:extLst>
+              <a:ext uri="{FF2B5EF4-FFF2-40B4-BE49-F238E27FC236}">
+                <a16:creationId xmlns:a16="http://schemas.microsoft.com/office/drawing/2014/main" id="{66C84D38-7A2C-4F22-B5E0-24F3E89BA922}"/>
+              </a:ext>
+            </a:extLst>
+          </p:cNvPr>
+          <p:cNvSpPr/>
+          <p:nvPr/>
+        </p:nvSpPr>
+        <p:spPr>
+          <a:xfrm>
+            <a:off x="6439156" y="2931822"/>
+            <a:ext cx="152200" cy="171073"/>
+          </a:xfrm>
+          <a:prstGeom prst="rect">
+            <a:avLst/>
+          </a:prstGeom>
+          <a:solidFill>
+            <a:srgbClr val="0070C0"/>
+          </a:solidFill>
+          <a:ln>
+            <a:solidFill>
+              <a:srgbClr val="0070C0"/>
+            </a:solidFill>
+          </a:ln>
+          <a:effectLst/>
+        </p:spPr>
+        <p:style>
+          <a:lnRef idx="1">
+            <a:schemeClr val="accent3"/>
+          </a:lnRef>
+          <a:fillRef idx="2">
+            <a:schemeClr val="accent3"/>
+          </a:fillRef>
+          <a:effectRef idx="1">
+            <a:schemeClr val="accent3"/>
+          </a:effectRef>
+          <a:fontRef idx="minor">
+            <a:schemeClr val="dk1"/>
+          </a:fontRef>
+        </p:style>
+        <p:txBody>
+          <a:bodyPr rtlCol="0" anchor="ctr"/>
+          <a:lstStyle/>
+          <a:p>
+            <a:pPr algn="ctr"/>
+            <a:endParaRPr lang="en-SG" sz="1400"/>
+          </a:p>
+        </p:txBody>
+      </p:sp>
+      <p:sp>
+        <p:nvSpPr>
+          <p:cNvPr id="72" name="TextBox 71">
+            <a:extLst>
+              <a:ext uri="{FF2B5EF4-FFF2-40B4-BE49-F238E27FC236}">
+                <a16:creationId xmlns:a16="http://schemas.microsoft.com/office/drawing/2014/main" id="{68167AA0-3158-4F4A-8457-727D82EBCC30}"/>
+              </a:ext>
+            </a:extLst>
+          </p:cNvPr>
+          <p:cNvSpPr txBox="1"/>
+          <p:nvPr/>
+        </p:nvSpPr>
+        <p:spPr>
+          <a:xfrm>
+            <a:off x="6592657" y="3771855"/>
+            <a:ext cx="1589036" cy="184666"/>
+          </a:xfrm>
+          <a:prstGeom prst="rect">
+            <a:avLst/>
+          </a:prstGeom>
+          <a:noFill/>
+        </p:spPr>
+        <p:txBody>
+          <a:bodyPr wrap="square" lIns="0" tIns="0" rIns="0" bIns="0" rtlCol="0">
+            <a:spAutoFit/>
+          </a:bodyPr>
+          <a:lstStyle>
+            <a:defPPr>
+              <a:defRPr lang="en-US"/>
+            </a:defPPr>
+            <a:lvl1pPr algn="r">
+              <a:defRPr sz="1400">
+                <a:solidFill>
+                  <a:srgbClr val="0070C0"/>
+                </a:solidFill>
+              </a:defRPr>
+            </a:lvl1pPr>
+          </a:lstStyle>
+          <a:p>
+            <a:r>
+              <a:rPr lang="en-US" sz="1200" dirty="0" err="1"/>
+              <a:t>setCurrentContext</a:t>
+            </a:r>
+            <a:r>
+              <a:rPr lang="en-US" sz="1200" dirty="0"/>
+              <a:t>(“e”)</a:t>
+            </a:r>
+          </a:p>
+        </p:txBody>
+      </p:sp>
+      <p:sp>
+        <p:nvSpPr>
+          <p:cNvPr id="85" name="Rectangle 84">
+            <a:extLst>
+              <a:ext uri="{FF2B5EF4-FFF2-40B4-BE49-F238E27FC236}">
+                <a16:creationId xmlns:a16="http://schemas.microsoft.com/office/drawing/2014/main" id="{3AFEEBFE-32B8-45E5-952F-30F9106A9F10}"/>
+              </a:ext>
+            </a:extLst>
+          </p:cNvPr>
+          <p:cNvSpPr/>
+          <p:nvPr/>
+        </p:nvSpPr>
+        <p:spPr>
+          <a:xfrm>
+            <a:off x="8254433" y="4023961"/>
+            <a:ext cx="233617" cy="702777"/>
+          </a:xfrm>
+          <a:prstGeom prst="rect">
+            <a:avLst/>
+          </a:prstGeom>
+          <a:solidFill>
+            <a:srgbClr val="7030A0"/>
+          </a:solidFill>
+          <a:ln>
+            <a:solidFill>
+              <a:srgbClr val="7030A0"/>
+            </a:solidFill>
+          </a:ln>
+          <a:effectLst/>
+        </p:spPr>
+        <p:style>
+          <a:lnRef idx="1">
+            <a:schemeClr val="accent3"/>
+          </a:lnRef>
+          <a:fillRef idx="2">
+            <a:schemeClr val="accent3"/>
+          </a:fillRef>
+          <a:effectRef idx="1">
+            <a:schemeClr val="accent3"/>
+          </a:effectRef>
+          <a:fontRef idx="minor">
+            <a:schemeClr val="dk1"/>
+          </a:fontRef>
+        </p:style>
+        <p:txBody>
+          <a:bodyPr rtlCol="0" anchor="ctr"/>
+          <a:lstStyle/>
+          <a:p>
+            <a:pPr algn="ctr"/>
+            <a:endParaRPr lang="en-SG" sz="1400"/>
+          </a:p>
+        </p:txBody>
+      </p:sp>
       <p:cxnSp>
         <p:nvCxnSpPr>
-          <p:cNvPr id="52" name="Straight Arrow Connector 51"/>
+          <p:cNvPr id="87" name="Straight Arrow Connector 86">
+            <a:extLst>
+              <a:ext uri="{FF2B5EF4-FFF2-40B4-BE49-F238E27FC236}">
+                <a16:creationId xmlns:a16="http://schemas.microsoft.com/office/drawing/2014/main" id="{47C11F1D-CE85-4565-AEBF-89F53B5CC4F1}"/>
+              </a:ext>
+            </a:extLst>
+          </p:cNvPr>
           <p:cNvCxnSpPr>
             <a:cxnSpLocks/>
           </p:cNvCxnSpPr>
@@ -4903,8 +5147,8 @@
         </p:nvCxnSpPr>
         <p:spPr>
           <a:xfrm>
-            <a:off x="7121416" y="3129995"/>
-            <a:ext cx="1909594" cy="0"/>
+            <a:off x="6629400" y="4696158"/>
+            <a:ext cx="1700859" cy="19795"/>
           </a:xfrm>
           <a:prstGeom prst="straightConnector1">
             <a:avLst/>
@@ -4913,7 +5157,9 @@
             <a:solidFill>
               <a:srgbClr val="7030A0"/>
             </a:solidFill>
-            <a:tailEnd type="arrow"/>
+            <a:prstDash val="sysDash"/>
+            <a:headEnd type="arrow" w="med" len="med"/>
+            <a:tailEnd type="none" w="med" len="med"/>
           </a:ln>
         </p:spPr>
         <p:style>
@@ -4933,10 +5179,217 @@
       </p:cxnSp>
       <p:sp>
         <p:nvSpPr>
-          <p:cNvPr id="47" name="TextBox 46">
+          <p:cNvPr id="41" name="Rectangle 62">
             <a:extLst>
               <a:ext uri="{FF2B5EF4-FFF2-40B4-BE49-F238E27FC236}">
-                <a16:creationId xmlns:a16="http://schemas.microsoft.com/office/drawing/2014/main" id="{90E1B110-D951-4D18-87D6-15DCDA58B69B}"/>
+                <a16:creationId xmlns:a16="http://schemas.microsoft.com/office/drawing/2014/main" id="{B78A3FC8-6CAF-49AD-A43C-FFC02BAE2D9C}"/>
+              </a:ext>
+            </a:extLst>
+          </p:cNvPr>
+          <p:cNvSpPr/>
+          <p:nvPr/>
+        </p:nvSpPr>
+        <p:spPr>
+          <a:xfrm>
+            <a:off x="9516913" y="3463748"/>
+            <a:ext cx="996792" cy="300180"/>
+          </a:xfrm>
+          <a:prstGeom prst="rect">
+            <a:avLst/>
+          </a:prstGeom>
+          <a:solidFill>
+            <a:srgbClr val="7030A0"/>
+          </a:solidFill>
+          <a:ln w="19050">
+            <a:solidFill>
+              <a:srgbClr val="7030A0"/>
+            </a:solidFill>
+          </a:ln>
+          <a:effectLst/>
+        </p:spPr>
+        <p:style>
+          <a:lnRef idx="1">
+            <a:schemeClr val="accent2"/>
+          </a:lnRef>
+          <a:fillRef idx="2">
+            <a:schemeClr val="accent2"/>
+          </a:fillRef>
+          <a:effectRef idx="1">
+            <a:schemeClr val="accent2"/>
+          </a:effectRef>
+          <a:fontRef idx="minor">
+            <a:schemeClr val="dk1"/>
+          </a:fontRef>
+        </p:style>
+        <p:txBody>
+          <a:bodyPr rtlCol="0" anchor="ctr"/>
+          <a:lstStyle/>
+          <a:p>
+            <a:pPr algn="ctr"/>
+            <a:r>
+              <a:rPr lang="en-US" sz="1600" dirty="0">
+                <a:solidFill>
+                  <a:schemeClr val="bg1"/>
+                </a:solidFill>
+              </a:rPr>
+              <a:t>: Context</a:t>
+            </a:r>
+            <a:endParaRPr lang="en-SG" sz="1600" dirty="0">
+              <a:solidFill>
+                <a:schemeClr val="bg1"/>
+              </a:solidFill>
+            </a:endParaRPr>
+          </a:p>
+        </p:txBody>
+      </p:sp>
+      <p:cxnSp>
+        <p:nvCxnSpPr>
+          <p:cNvPr id="45" name="Straight Connector 44">
+            <a:extLst>
+              <a:ext uri="{FF2B5EF4-FFF2-40B4-BE49-F238E27FC236}">
+                <a16:creationId xmlns:a16="http://schemas.microsoft.com/office/drawing/2014/main" id="{CFD98A32-7C4C-4E96-8F24-54B792BF6158}"/>
+              </a:ext>
+            </a:extLst>
+          </p:cNvPr>
+          <p:cNvCxnSpPr>
+            <a:cxnSpLocks/>
+          </p:cNvCxnSpPr>
+          <p:nvPr/>
+        </p:nvCxnSpPr>
+        <p:spPr>
+          <a:xfrm>
+            <a:off x="10003388" y="3755848"/>
+            <a:ext cx="4297" cy="1054295"/>
+          </a:xfrm>
+          <a:prstGeom prst="line">
+            <a:avLst/>
+          </a:prstGeom>
+          <a:ln w="19050">
+            <a:solidFill>
+              <a:srgbClr val="7030A0"/>
+            </a:solidFill>
+            <a:prstDash val="sysDash"/>
+          </a:ln>
+          <a:effectLst/>
+        </p:spPr>
+        <p:style>
+          <a:lnRef idx="1">
+            <a:schemeClr val="accent1"/>
+          </a:lnRef>
+          <a:fillRef idx="2">
+            <a:schemeClr val="accent1"/>
+          </a:fillRef>
+          <a:effectRef idx="1">
+            <a:schemeClr val="accent1"/>
+          </a:effectRef>
+          <a:fontRef idx="minor">
+            <a:schemeClr val="dk1"/>
+          </a:fontRef>
+        </p:style>
+      </p:cxnSp>
+      <p:sp>
+        <p:nvSpPr>
+          <p:cNvPr id="48" name="Rectangle 47">
+            <a:extLst>
+              <a:ext uri="{FF2B5EF4-FFF2-40B4-BE49-F238E27FC236}">
+                <a16:creationId xmlns:a16="http://schemas.microsoft.com/office/drawing/2014/main" id="{A837F9B3-2EF2-40A4-B6F1-80480B194316}"/>
+              </a:ext>
+            </a:extLst>
+          </p:cNvPr>
+          <p:cNvSpPr/>
+          <p:nvPr/>
+        </p:nvSpPr>
+        <p:spPr>
+          <a:xfrm>
+            <a:off x="9894271" y="4176288"/>
+            <a:ext cx="207284" cy="374664"/>
+          </a:xfrm>
+          <a:prstGeom prst="rect">
+            <a:avLst/>
+          </a:prstGeom>
+          <a:solidFill>
+            <a:srgbClr val="7030A0"/>
+          </a:solidFill>
+          <a:ln>
+            <a:solidFill>
+              <a:srgbClr val="7030A0"/>
+            </a:solidFill>
+          </a:ln>
+          <a:effectLst/>
+        </p:spPr>
+        <p:style>
+          <a:lnRef idx="1">
+            <a:schemeClr val="accent3"/>
+          </a:lnRef>
+          <a:fillRef idx="2">
+            <a:schemeClr val="accent3"/>
+          </a:fillRef>
+          <a:effectRef idx="1">
+            <a:schemeClr val="accent3"/>
+          </a:effectRef>
+          <a:fontRef idx="minor">
+            <a:schemeClr val="dk1"/>
+          </a:fontRef>
+        </p:style>
+        <p:txBody>
+          <a:bodyPr rtlCol="0" anchor="ctr"/>
+          <a:lstStyle/>
+          <a:p>
+            <a:pPr algn="ctr"/>
+            <a:endParaRPr lang="en-SG" sz="1400"/>
+          </a:p>
+        </p:txBody>
+      </p:sp>
+      <p:cxnSp>
+        <p:nvCxnSpPr>
+          <p:cNvPr id="49" name="Straight Arrow Connector 48">
+            <a:extLst>
+              <a:ext uri="{FF2B5EF4-FFF2-40B4-BE49-F238E27FC236}">
+                <a16:creationId xmlns:a16="http://schemas.microsoft.com/office/drawing/2014/main" id="{550D14CF-BEC3-4372-ACC9-ED21B41B80BB}"/>
+              </a:ext>
+            </a:extLst>
+          </p:cNvPr>
+          <p:cNvCxnSpPr>
+            <a:cxnSpLocks/>
+          </p:cNvCxnSpPr>
+          <p:nvPr/>
+        </p:nvCxnSpPr>
+        <p:spPr>
+          <a:xfrm>
+            <a:off x="8439103" y="4231582"/>
+            <a:ext cx="1455168" cy="3062"/>
+          </a:xfrm>
+          <a:prstGeom prst="straightConnector1">
+            <a:avLst/>
+          </a:prstGeom>
+          <a:ln w="19050">
+            <a:solidFill>
+              <a:srgbClr val="7030A0"/>
+            </a:solidFill>
+            <a:tailEnd type="arrow"/>
+          </a:ln>
+        </p:spPr>
+        <p:style>
+          <a:lnRef idx="1">
+            <a:schemeClr val="accent1"/>
+          </a:lnRef>
+          <a:fillRef idx="0">
+            <a:schemeClr val="accent1"/>
+          </a:fillRef>
+          <a:effectRef idx="0">
+            <a:schemeClr val="accent1"/>
+          </a:effectRef>
+          <a:fontRef idx="minor">
+            <a:schemeClr val="tx1"/>
+          </a:fontRef>
+        </p:style>
+      </p:cxnSp>
+      <p:sp>
+        <p:nvSpPr>
+          <p:cNvPr id="53" name="TextBox 52">
+            <a:extLst>
+              <a:ext uri="{FF2B5EF4-FFF2-40B4-BE49-F238E27FC236}">
+                <a16:creationId xmlns:a16="http://schemas.microsoft.com/office/drawing/2014/main" id="{054B2561-8A46-4166-951D-EFC4F2D338B2}"/>
               </a:ext>
             </a:extLst>
           </p:cNvPr>
@@ -4945,8 +5398,8 @@
         </p:nvSpPr>
         <p:spPr>
           <a:xfrm>
-            <a:off x="2715934" y="1835477"/>
-            <a:ext cx="875325" cy="215444"/>
+            <a:off x="8540220" y="3991621"/>
+            <a:ext cx="1309358" cy="184666"/>
           </a:xfrm>
           <a:prstGeom prst="rect">
             <a:avLst/>
@@ -4971,91 +5424,77 @@
           </a:lstStyle>
           <a:p>
             <a:r>
-              <a:rPr lang="en-US" dirty="0"/>
-              <a:t>parse(“-e”)</a:t>
-            </a:r>
-          </a:p>
-        </p:txBody>
-      </p:sp>
-      <p:sp>
-        <p:nvSpPr>
-          <p:cNvPr id="51" name="Rectangle 62">
+              <a:rPr lang="en-US" sz="1200" dirty="0" err="1">
+                <a:solidFill>
+                  <a:srgbClr val="7030A0"/>
+                </a:solidFill>
+              </a:rPr>
+              <a:t>setContextValue</a:t>
+            </a:r>
+            <a:r>
+              <a:rPr lang="en-US" sz="1200" dirty="0">
+                <a:solidFill>
+                  <a:srgbClr val="7030A0"/>
+                </a:solidFill>
+              </a:rPr>
+              <a:t>(“e”)</a:t>
+            </a:r>
+            <a:endParaRPr lang="en-US" sz="1200" dirty="0"/>
+          </a:p>
+        </p:txBody>
+      </p:sp>
+      <p:cxnSp>
+        <p:nvCxnSpPr>
+          <p:cNvPr id="58" name="Straight Arrow Connector 57">
             <a:extLst>
               <a:ext uri="{FF2B5EF4-FFF2-40B4-BE49-F238E27FC236}">
-                <a16:creationId xmlns:a16="http://schemas.microsoft.com/office/drawing/2014/main" id="{5EC97B0A-7289-495B-8356-E4A4DEB293EF}"/>
+                <a16:creationId xmlns:a16="http://schemas.microsoft.com/office/drawing/2014/main" id="{82BC6DBA-B13C-4D82-9516-0F09CB97B7B8}"/>
               </a:ext>
             </a:extLst>
           </p:cNvPr>
-          <p:cNvSpPr/>
+          <p:cNvCxnSpPr>
+            <a:cxnSpLocks/>
+          </p:cNvCxnSpPr>
           <p:nvPr/>
-        </p:nvSpPr>
-        <p:spPr>
-          <a:xfrm>
-            <a:off x="6189825" y="2221709"/>
-            <a:ext cx="1635602" cy="461538"/>
-          </a:xfrm>
-          <a:prstGeom prst="rect">
+        </p:nvCxnSpPr>
+        <p:spPr>
+          <a:xfrm>
+            <a:off x="8458200" y="4550951"/>
+            <a:ext cx="1399603" cy="0"/>
+          </a:xfrm>
+          <a:prstGeom prst="straightConnector1">
             <a:avLst/>
           </a:prstGeom>
-          <a:solidFill>
-            <a:srgbClr val="0070C0"/>
-          </a:solidFill>
           <a:ln w="19050">
             <a:solidFill>
-              <a:srgbClr val="0070C0"/>
+              <a:srgbClr val="7030A0"/>
             </a:solidFill>
+            <a:prstDash val="sysDash"/>
+            <a:headEnd type="arrow" w="med" len="med"/>
+            <a:tailEnd type="none" w="med" len="med"/>
           </a:ln>
-          <a:effectLst/>
         </p:spPr>
         <p:style>
           <a:lnRef idx="1">
-            <a:schemeClr val="accent2"/>
+            <a:schemeClr val="accent1"/>
           </a:lnRef>
-          <a:fillRef idx="2">
-            <a:schemeClr val="accent2"/>
+          <a:fillRef idx="0">
+            <a:schemeClr val="accent1"/>
           </a:fillRef>
-          <a:effectRef idx="1">
-            <a:schemeClr val="accent2"/>
+          <a:effectRef idx="0">
+            <a:schemeClr val="accent1"/>
           </a:effectRef>
           <a:fontRef idx="minor">
-            <a:schemeClr val="dk1"/>
+            <a:schemeClr val="tx1"/>
           </a:fontRef>
         </p:style>
-        <p:txBody>
-          <a:bodyPr rtlCol="0" anchor="ctr"/>
-          <a:lstStyle/>
-          <a:p>
-            <a:pPr algn="ctr"/>
-            <a:r>
-              <a:rPr lang="en-US" sz="1600" dirty="0">
-                <a:solidFill>
-                  <a:schemeClr val="bg1"/>
-                </a:solidFill>
-              </a:rPr>
-              <a:t>:</a:t>
-            </a:r>
-            <a:r>
-              <a:rPr lang="en-US" sz="1600" dirty="0" err="1">
-                <a:solidFill>
-                  <a:schemeClr val="bg1"/>
-                </a:solidFill>
-              </a:rPr>
-              <a:t>SwitchCommand</a:t>
-            </a:r>
-            <a:endParaRPr lang="en-SG" sz="1600" dirty="0">
-              <a:solidFill>
-                <a:schemeClr val="bg1"/>
-              </a:solidFill>
-            </a:endParaRPr>
-          </a:p>
-        </p:txBody>
-      </p:sp>
-      <p:sp>
-        <p:nvSpPr>
-          <p:cNvPr id="57" name="TextBox 56">
+      </p:cxnSp>
+      <p:sp>
+        <p:nvSpPr>
+          <p:cNvPr id="54" name="TextBox 53">
             <a:extLst>
               <a:ext uri="{FF2B5EF4-FFF2-40B4-BE49-F238E27FC236}">
-                <a16:creationId xmlns:a16="http://schemas.microsoft.com/office/drawing/2014/main" id="{9B128A04-D620-4490-80E7-830DB8A94CF1}"/>
+                <a16:creationId xmlns:a16="http://schemas.microsoft.com/office/drawing/2014/main" id="{5E30A65B-6054-485B-9CED-FD21D466036B}"/>
               </a:ext>
             </a:extLst>
           </p:cNvPr>
@@ -5064,8 +5503,92 @@
         </p:nvSpPr>
         <p:spPr>
           <a:xfrm>
-            <a:off x="4352582" y="2220290"/>
-            <a:ext cx="1756536" cy="215444"/>
+            <a:off x="6428996" y="4996190"/>
+            <a:ext cx="258404" cy="261610"/>
+          </a:xfrm>
+          <a:prstGeom prst="rect">
+            <a:avLst/>
+          </a:prstGeom>
+          <a:noFill/>
+        </p:spPr>
+        <p:txBody>
+          <a:bodyPr wrap="none" rtlCol="0">
+            <a:spAutoFit/>
+          </a:bodyPr>
+          <a:lstStyle/>
+          <a:p>
+            <a:r>
+              <a:rPr lang="en-SG" sz="1100" dirty="0">
+                <a:solidFill>
+                  <a:srgbClr val="002060"/>
+                </a:solidFill>
+              </a:rPr>
+              <a:t>X</a:t>
+            </a:r>
+          </a:p>
+        </p:txBody>
+      </p:sp>
+      <p:cxnSp>
+        <p:nvCxnSpPr>
+          <p:cNvPr id="97" name="Straight Arrow Connector 96">
+            <a:extLst>
+              <a:ext uri="{FF2B5EF4-FFF2-40B4-BE49-F238E27FC236}">
+                <a16:creationId xmlns:a16="http://schemas.microsoft.com/office/drawing/2014/main" id="{48FAD504-E5A6-488C-B7F9-3A0E24AEB6B1}"/>
+              </a:ext>
+            </a:extLst>
+          </p:cNvPr>
+          <p:cNvCxnSpPr>
+            <a:cxnSpLocks/>
+            <a:endCxn id="51" idx="1"/>
+          </p:cNvCxnSpPr>
+          <p:nvPr/>
+        </p:nvCxnSpPr>
+        <p:spPr>
+          <a:xfrm>
+            <a:off x="3957191" y="2725134"/>
+            <a:ext cx="1704781" cy="13757"/>
+          </a:xfrm>
+          <a:prstGeom prst="straightConnector1">
+            <a:avLst/>
+          </a:prstGeom>
+          <a:ln w="19050">
+            <a:solidFill>
+              <a:srgbClr val="0070C0"/>
+            </a:solidFill>
+            <a:tailEnd type="arrow"/>
+          </a:ln>
+        </p:spPr>
+        <p:style>
+          <a:lnRef idx="1">
+            <a:schemeClr val="accent1"/>
+          </a:lnRef>
+          <a:fillRef idx="0">
+            <a:schemeClr val="accent1"/>
+          </a:fillRef>
+          <a:effectRef idx="0">
+            <a:schemeClr val="accent1"/>
+          </a:effectRef>
+          <a:fontRef idx="minor">
+            <a:schemeClr val="tx1"/>
+          </a:fontRef>
+        </p:style>
+      </p:cxnSp>
+      <p:sp>
+        <p:nvSpPr>
+          <p:cNvPr id="99" name="TextBox 98">
+            <a:extLst>
+              <a:ext uri="{FF2B5EF4-FFF2-40B4-BE49-F238E27FC236}">
+                <a16:creationId xmlns:a16="http://schemas.microsoft.com/office/drawing/2014/main" id="{87A2D864-7369-498F-98EA-EBBB8A224363}"/>
+              </a:ext>
+            </a:extLst>
+          </p:cNvPr>
+          <p:cNvSpPr txBox="1"/>
+          <p:nvPr/>
+        </p:nvSpPr>
+        <p:spPr>
+          <a:xfrm>
+            <a:off x="3792374" y="2447373"/>
+            <a:ext cx="1763295" cy="215444"/>
           </a:xfrm>
           <a:prstGeom prst="rect">
             <a:avLst/>
@@ -5095,219 +5618,17 @@
             </a:r>
             <a:r>
               <a:rPr lang="en-US" dirty="0"/>
-              <a:t>(“e”)</a:t>
-            </a:r>
-          </a:p>
-        </p:txBody>
-      </p:sp>
-      <p:sp>
-        <p:nvSpPr>
-          <p:cNvPr id="59" name="Rectangle 58">
+              <a:t>(“e)</a:t>
+            </a:r>
+          </a:p>
+        </p:txBody>
+      </p:sp>
+      <p:cxnSp>
+        <p:nvCxnSpPr>
+          <p:cNvPr id="122" name="Straight Arrow Connector 121">
             <a:extLst>
               <a:ext uri="{FF2B5EF4-FFF2-40B4-BE49-F238E27FC236}">
-                <a16:creationId xmlns:a16="http://schemas.microsoft.com/office/drawing/2014/main" id="{66C84D38-7A2C-4F22-B5E0-24F3E89BA922}"/>
-              </a:ext>
-            </a:extLst>
-          </p:cNvPr>
-          <p:cNvSpPr/>
-          <p:nvPr/>
-        </p:nvSpPr>
-        <p:spPr>
-          <a:xfrm>
-            <a:off x="6967009" y="2645409"/>
-            <a:ext cx="154393" cy="1044910"/>
-          </a:xfrm>
-          <a:prstGeom prst="rect">
-            <a:avLst/>
-          </a:prstGeom>
-          <a:solidFill>
-            <a:srgbClr val="0070C0"/>
-          </a:solidFill>
-          <a:ln>
-            <a:solidFill>
-              <a:srgbClr val="0070C0"/>
-            </a:solidFill>
-          </a:ln>
-          <a:effectLst/>
-        </p:spPr>
-        <p:style>
-          <a:lnRef idx="1">
-            <a:schemeClr val="accent3"/>
-          </a:lnRef>
-          <a:fillRef idx="2">
-            <a:schemeClr val="accent3"/>
-          </a:fillRef>
-          <a:effectRef idx="1">
-            <a:schemeClr val="accent3"/>
-          </a:effectRef>
-          <a:fontRef idx="minor">
-            <a:schemeClr val="dk1"/>
-          </a:fontRef>
-        </p:style>
-        <p:txBody>
-          <a:bodyPr rtlCol="0" anchor="ctr"/>
-          <a:lstStyle/>
-          <a:p>
-            <a:pPr algn="ctr"/>
-            <a:endParaRPr lang="en-SG" sz="1400"/>
-          </a:p>
-        </p:txBody>
-      </p:sp>
-      <p:sp>
-        <p:nvSpPr>
-          <p:cNvPr id="71" name="TextBox 70">
-            <a:extLst>
-              <a:ext uri="{FF2B5EF4-FFF2-40B4-BE49-F238E27FC236}">
-                <a16:creationId xmlns:a16="http://schemas.microsoft.com/office/drawing/2014/main" id="{AE54E49B-BF66-4DA8-A939-98ED8F49A676}"/>
-              </a:ext>
-            </a:extLst>
-          </p:cNvPr>
-          <p:cNvSpPr txBox="1"/>
-          <p:nvPr/>
-        </p:nvSpPr>
-        <p:spPr>
-          <a:xfrm>
-            <a:off x="5386746" y="3338523"/>
-            <a:ext cx="621216" cy="215444"/>
-          </a:xfrm>
-          <a:prstGeom prst="rect">
-            <a:avLst/>
-          </a:prstGeom>
-          <a:noFill/>
-        </p:spPr>
-        <p:txBody>
-          <a:bodyPr wrap="square" lIns="0" tIns="0" rIns="0" bIns="0" rtlCol="0">
-            <a:spAutoFit/>
-          </a:bodyPr>
-          <a:lstStyle>
-            <a:defPPr>
-              <a:defRPr lang="en-US"/>
-            </a:defPPr>
-            <a:lvl1pPr algn="r">
-              <a:defRPr sz="1400">
-                <a:solidFill>
-                  <a:srgbClr val="0070C0"/>
-                </a:solidFill>
-              </a:defRPr>
-            </a:lvl1pPr>
-          </a:lstStyle>
-          <a:p>
-            <a:r>
-              <a:rPr lang="en-US" dirty="0"/>
-              <a:t>result</a:t>
-            </a:r>
-          </a:p>
-        </p:txBody>
-      </p:sp>
-      <p:sp>
-        <p:nvSpPr>
-          <p:cNvPr id="72" name="TextBox 71">
-            <a:extLst>
-              <a:ext uri="{FF2B5EF4-FFF2-40B4-BE49-F238E27FC236}">
-                <a16:creationId xmlns:a16="http://schemas.microsoft.com/office/drawing/2014/main" id="{68167AA0-3158-4F4A-8457-727D82EBCC30}"/>
-              </a:ext>
-            </a:extLst>
-          </p:cNvPr>
-          <p:cNvSpPr txBox="1"/>
-          <p:nvPr/>
-        </p:nvSpPr>
-        <p:spPr>
-          <a:xfrm>
-            <a:off x="7086295" y="2881189"/>
-            <a:ext cx="1589036" cy="184666"/>
-          </a:xfrm>
-          <a:prstGeom prst="rect">
-            <a:avLst/>
-          </a:prstGeom>
-          <a:noFill/>
-        </p:spPr>
-        <p:txBody>
-          <a:bodyPr wrap="square" lIns="0" tIns="0" rIns="0" bIns="0" rtlCol="0">
-            <a:spAutoFit/>
-          </a:bodyPr>
-          <a:lstStyle>
-            <a:defPPr>
-              <a:defRPr lang="en-US"/>
-            </a:defPPr>
-            <a:lvl1pPr algn="r">
-              <a:defRPr sz="1400">
-                <a:solidFill>
-                  <a:srgbClr val="0070C0"/>
-                </a:solidFill>
-              </a:defRPr>
-            </a:lvl1pPr>
-          </a:lstStyle>
-          <a:p>
-            <a:r>
-              <a:rPr lang="en-US" sz="1200" dirty="0" err="1"/>
-              <a:t>setCurrentContext</a:t>
-            </a:r>
-            <a:r>
-              <a:rPr lang="en-US" sz="1200" dirty="0"/>
-              <a:t>(“e”)</a:t>
-            </a:r>
-          </a:p>
-        </p:txBody>
-      </p:sp>
-      <p:sp>
-        <p:nvSpPr>
-          <p:cNvPr id="85" name="Rectangle 84">
-            <a:extLst>
-              <a:ext uri="{FF2B5EF4-FFF2-40B4-BE49-F238E27FC236}">
-                <a16:creationId xmlns:a16="http://schemas.microsoft.com/office/drawing/2014/main" id="{3AFEEBFE-32B8-45E5-952F-30F9106A9F10}"/>
-              </a:ext>
-            </a:extLst>
-          </p:cNvPr>
-          <p:cNvSpPr/>
-          <p:nvPr/>
-        </p:nvSpPr>
-        <p:spPr>
-          <a:xfrm>
-            <a:off x="9031011" y="3065954"/>
-            <a:ext cx="233617" cy="702777"/>
-          </a:xfrm>
-          <a:prstGeom prst="rect">
-            <a:avLst/>
-          </a:prstGeom>
-          <a:solidFill>
-            <a:srgbClr val="7030A0"/>
-          </a:solidFill>
-          <a:ln>
-            <a:solidFill>
-              <a:srgbClr val="7030A0"/>
-            </a:solidFill>
-          </a:ln>
-          <a:effectLst/>
-        </p:spPr>
-        <p:style>
-          <a:lnRef idx="1">
-            <a:schemeClr val="accent3"/>
-          </a:lnRef>
-          <a:fillRef idx="2">
-            <a:schemeClr val="accent3"/>
-          </a:fillRef>
-          <a:effectRef idx="1">
-            <a:schemeClr val="accent3"/>
-          </a:effectRef>
-          <a:fontRef idx="minor">
-            <a:schemeClr val="dk1"/>
-          </a:fontRef>
-        </p:style>
-        <p:txBody>
-          <a:bodyPr rtlCol="0" anchor="ctr"/>
-          <a:lstStyle/>
-          <a:p>
-            <a:pPr algn="ctr"/>
-            <a:endParaRPr lang="en-SG" sz="1400"/>
-          </a:p>
-        </p:txBody>
-      </p:sp>
-      <p:cxnSp>
-        <p:nvCxnSpPr>
-          <p:cNvPr id="87" name="Straight Arrow Connector 86">
-            <a:extLst>
-              <a:ext uri="{FF2B5EF4-FFF2-40B4-BE49-F238E27FC236}">
-                <a16:creationId xmlns:a16="http://schemas.microsoft.com/office/drawing/2014/main" id="{47C11F1D-CE85-4565-AEBF-89F53B5CC4F1}"/>
+                <a16:creationId xmlns:a16="http://schemas.microsoft.com/office/drawing/2014/main" id="{A4F19D8A-714E-459A-A792-8950AF0EFE3A}"/>
               </a:ext>
             </a:extLst>
           </p:cNvPr>
@@ -5318,15 +5639,15 @@
         </p:nvCxnSpPr>
         <p:spPr>
           <a:xfrm>
-            <a:off x="7212587" y="3690321"/>
-            <a:ext cx="1799327" cy="10563"/>
+            <a:off x="-1313405" y="3371445"/>
+            <a:ext cx="2256705" cy="1"/>
           </a:xfrm>
           <a:prstGeom prst="straightConnector1">
             <a:avLst/>
           </a:prstGeom>
           <a:ln w="19050">
             <a:solidFill>
-              <a:srgbClr val="7030A0"/>
+              <a:srgbClr val="0070C0"/>
             </a:solidFill>
             <a:prstDash val="sysDash"/>
             <a:headEnd type="arrow" w="med" len="med"/>
@@ -5350,10 +5671,10 @@
       </p:cxnSp>
       <p:sp>
         <p:nvSpPr>
-          <p:cNvPr id="41" name="Rectangle 62">
+          <p:cNvPr id="128" name="Rectangle 127">
             <a:extLst>
               <a:ext uri="{FF2B5EF4-FFF2-40B4-BE49-F238E27FC236}">
-                <a16:creationId xmlns:a16="http://schemas.microsoft.com/office/drawing/2014/main" id="{B78A3FC8-6CAF-49AD-A43C-FFC02BAE2D9C}"/>
+                <a16:creationId xmlns:a16="http://schemas.microsoft.com/office/drawing/2014/main" id="{349DED1C-65AD-40FA-80C7-3835270E0D59}"/>
               </a:ext>
             </a:extLst>
           </p:cNvPr>
@@ -5362,128 +5683,18 @@
         </p:nvSpPr>
         <p:spPr>
           <a:xfrm>
-            <a:off x="10280807" y="2318115"/>
-            <a:ext cx="996792" cy="300180"/>
+            <a:off x="6476364" y="3857049"/>
+            <a:ext cx="152200" cy="953094"/>
           </a:xfrm>
           <a:prstGeom prst="rect">
             <a:avLst/>
           </a:prstGeom>
           <a:solidFill>
-            <a:srgbClr val="7030A0"/>
-          </a:solidFill>
-          <a:ln w="19050">
-            <a:solidFill>
-              <a:srgbClr val="7030A0"/>
-            </a:solidFill>
-          </a:ln>
-          <a:effectLst/>
-        </p:spPr>
-        <p:style>
-          <a:lnRef idx="1">
-            <a:schemeClr val="accent2"/>
-          </a:lnRef>
-          <a:fillRef idx="2">
-            <a:schemeClr val="accent2"/>
-          </a:fillRef>
-          <a:effectRef idx="1">
-            <a:schemeClr val="accent2"/>
-          </a:effectRef>
-          <a:fontRef idx="minor">
-            <a:schemeClr val="dk1"/>
-          </a:fontRef>
-        </p:style>
-        <p:txBody>
-          <a:bodyPr rtlCol="0" anchor="ctr"/>
-          <a:lstStyle/>
-          <a:p>
-            <a:pPr algn="ctr"/>
-            <a:r>
-              <a:rPr lang="en-US" sz="1600" dirty="0">
-                <a:solidFill>
-                  <a:schemeClr val="bg1"/>
-                </a:solidFill>
-              </a:rPr>
-              <a:t>: Context</a:t>
-            </a:r>
-            <a:endParaRPr lang="en-SG" sz="1600" dirty="0">
-              <a:solidFill>
-                <a:schemeClr val="bg1"/>
-              </a:solidFill>
-            </a:endParaRPr>
-          </a:p>
-        </p:txBody>
-      </p:sp>
-      <p:cxnSp>
-        <p:nvCxnSpPr>
-          <p:cNvPr id="45" name="Straight Connector 44">
-            <a:extLst>
-              <a:ext uri="{FF2B5EF4-FFF2-40B4-BE49-F238E27FC236}">
-                <a16:creationId xmlns:a16="http://schemas.microsoft.com/office/drawing/2014/main" id="{CFD98A32-7C4C-4E96-8F24-54B792BF6158}"/>
-              </a:ext>
-            </a:extLst>
-          </p:cNvPr>
-          <p:cNvCxnSpPr>
-            <a:cxnSpLocks/>
-          </p:cNvCxnSpPr>
-          <p:nvPr/>
-        </p:nvCxnSpPr>
-        <p:spPr>
-          <a:xfrm>
-            <a:off x="10836853" y="2358061"/>
-            <a:ext cx="17130" cy="1534816"/>
-          </a:xfrm>
-          <a:prstGeom prst="line">
-            <a:avLst/>
-          </a:prstGeom>
-          <a:ln w="19050">
-            <a:solidFill>
-              <a:srgbClr val="7030A0"/>
-            </a:solidFill>
-            <a:prstDash val="sysDash"/>
-          </a:ln>
-          <a:effectLst/>
-        </p:spPr>
-        <p:style>
-          <a:lnRef idx="1">
-            <a:schemeClr val="accent1"/>
-          </a:lnRef>
-          <a:fillRef idx="2">
-            <a:schemeClr val="accent1"/>
-          </a:fillRef>
-          <a:effectRef idx="1">
-            <a:schemeClr val="accent1"/>
-          </a:effectRef>
-          <a:fontRef idx="minor">
-            <a:schemeClr val="dk1"/>
-          </a:fontRef>
-        </p:style>
-      </p:cxnSp>
-      <p:sp>
-        <p:nvSpPr>
-          <p:cNvPr id="48" name="Rectangle 47">
-            <a:extLst>
-              <a:ext uri="{FF2B5EF4-FFF2-40B4-BE49-F238E27FC236}">
-                <a16:creationId xmlns:a16="http://schemas.microsoft.com/office/drawing/2014/main" id="{A837F9B3-2EF2-40A4-B6F1-80480B194316}"/>
-              </a:ext>
-            </a:extLst>
-          </p:cNvPr>
-          <p:cNvSpPr/>
-          <p:nvPr/>
-        </p:nvSpPr>
-        <p:spPr>
-          <a:xfrm>
-            <a:off x="10727274" y="2953961"/>
-            <a:ext cx="218237" cy="638737"/>
-          </a:xfrm>
-          <a:prstGeom prst="rect">
-            <a:avLst/>
-          </a:prstGeom>
-          <a:solidFill>
-            <a:srgbClr val="7030A0"/>
+            <a:srgbClr val="0070C0"/>
           </a:solidFill>
           <a:ln>
             <a:solidFill>
-              <a:srgbClr val="7030A0"/>
+              <a:srgbClr val="0070C0"/>
             </a:solidFill>
           </a:ln>
           <a:effectLst/>
@@ -5513,30 +5724,29 @@
       </p:sp>
       <p:cxnSp>
         <p:nvCxnSpPr>
-          <p:cNvPr id="49" name="Straight Arrow Connector 48">
+          <p:cNvPr id="135" name="Straight Arrow Connector 134">
             <a:extLst>
               <a:ext uri="{FF2B5EF4-FFF2-40B4-BE49-F238E27FC236}">
-                <a16:creationId xmlns:a16="http://schemas.microsoft.com/office/drawing/2014/main" id="{550D14CF-BEC3-4372-ACC9-ED21B41B80BB}"/>
+                <a16:creationId xmlns:a16="http://schemas.microsoft.com/office/drawing/2014/main" id="{C302379E-BC9D-4730-B8AF-982EDB7DAE90}"/>
               </a:ext>
             </a:extLst>
           </p:cNvPr>
           <p:cNvCxnSpPr>
             <a:cxnSpLocks/>
-            <a:endCxn id="48" idx="1"/>
           </p:cNvCxnSpPr>
           <p:nvPr/>
         </p:nvCxnSpPr>
         <p:spPr>
           <a:xfrm>
-            <a:off x="9264628" y="3273097"/>
-            <a:ext cx="1462646" cy="233"/>
+            <a:off x="6629400" y="4049953"/>
+            <a:ext cx="1615169" cy="0"/>
           </a:xfrm>
           <a:prstGeom prst="straightConnector1">
             <a:avLst/>
           </a:prstGeom>
           <a:ln w="19050">
             <a:solidFill>
-              <a:srgbClr val="7030A0"/>
+              <a:srgbClr val="0070C0"/>
             </a:solidFill>
             <a:tailEnd type="arrow"/>
           </a:ln>
@@ -5556,150 +5766,6 @@
           </a:fontRef>
         </p:style>
       </p:cxnSp>
-      <p:sp>
-        <p:nvSpPr>
-          <p:cNvPr id="53" name="TextBox 52">
-            <a:extLst>
-              <a:ext uri="{FF2B5EF4-FFF2-40B4-BE49-F238E27FC236}">
-                <a16:creationId xmlns:a16="http://schemas.microsoft.com/office/drawing/2014/main" id="{054B2561-8A46-4166-951D-EFC4F2D338B2}"/>
-              </a:ext>
-            </a:extLst>
-          </p:cNvPr>
-          <p:cNvSpPr txBox="1"/>
-          <p:nvPr/>
-        </p:nvSpPr>
-        <p:spPr>
-          <a:xfrm>
-            <a:off x="9314996" y="3010308"/>
-            <a:ext cx="1309358" cy="184666"/>
-          </a:xfrm>
-          <a:prstGeom prst="rect">
-            <a:avLst/>
-          </a:prstGeom>
-          <a:noFill/>
-        </p:spPr>
-        <p:txBody>
-          <a:bodyPr wrap="square" lIns="0" tIns="0" rIns="0" bIns="0" rtlCol="0">
-            <a:spAutoFit/>
-          </a:bodyPr>
-          <a:lstStyle>
-            <a:defPPr>
-              <a:defRPr lang="en-US"/>
-            </a:defPPr>
-            <a:lvl1pPr algn="r">
-              <a:defRPr sz="1400">
-                <a:solidFill>
-                  <a:srgbClr val="0070C0"/>
-                </a:solidFill>
-              </a:defRPr>
-            </a:lvl1pPr>
-          </a:lstStyle>
-          <a:p>
-            <a:r>
-              <a:rPr lang="en-US" sz="1200" dirty="0" err="1">
-                <a:solidFill>
-                  <a:srgbClr val="7030A0"/>
-                </a:solidFill>
-              </a:rPr>
-              <a:t>setContextValue</a:t>
-            </a:r>
-            <a:r>
-              <a:rPr lang="en-US" sz="1200" dirty="0">
-                <a:solidFill>
-                  <a:srgbClr val="7030A0"/>
-                </a:solidFill>
-              </a:rPr>
-              <a:t>(“e”)</a:t>
-            </a:r>
-            <a:endParaRPr lang="en-US" sz="1200" dirty="0"/>
-          </a:p>
-        </p:txBody>
-      </p:sp>
-      <p:cxnSp>
-        <p:nvCxnSpPr>
-          <p:cNvPr id="58" name="Straight Arrow Connector 57">
-            <a:extLst>
-              <a:ext uri="{FF2B5EF4-FFF2-40B4-BE49-F238E27FC236}">
-                <a16:creationId xmlns:a16="http://schemas.microsoft.com/office/drawing/2014/main" id="{82BC6DBA-B13C-4D82-9516-0F09CB97B7B8}"/>
-              </a:ext>
-            </a:extLst>
-          </p:cNvPr>
-          <p:cNvCxnSpPr>
-            <a:cxnSpLocks/>
-          </p:cNvCxnSpPr>
-          <p:nvPr/>
-        </p:nvCxnSpPr>
-        <p:spPr>
-          <a:xfrm>
-            <a:off x="9283725" y="3592466"/>
-            <a:ext cx="1399603" cy="0"/>
-          </a:xfrm>
-          <a:prstGeom prst="straightConnector1">
-            <a:avLst/>
-          </a:prstGeom>
-          <a:ln w="19050">
-            <a:solidFill>
-              <a:srgbClr val="7030A0"/>
-            </a:solidFill>
-            <a:prstDash val="sysDash"/>
-            <a:headEnd type="arrow" w="med" len="med"/>
-            <a:tailEnd type="none" w="med" len="med"/>
-          </a:ln>
-        </p:spPr>
-        <p:style>
-          <a:lnRef idx="1">
-            <a:schemeClr val="accent1"/>
-          </a:lnRef>
-          <a:fillRef idx="0">
-            <a:schemeClr val="accent1"/>
-          </a:fillRef>
-          <a:effectRef idx="0">
-            <a:schemeClr val="accent1"/>
-          </a:effectRef>
-          <a:fontRef idx="minor">
-            <a:schemeClr val="tx1"/>
-          </a:fontRef>
-        </p:style>
-      </p:cxnSp>
-      <p:sp>
-        <p:nvSpPr>
-          <p:cNvPr id="54" name="TextBox 53">
-            <a:extLst>
-              <a:ext uri="{FF2B5EF4-FFF2-40B4-BE49-F238E27FC236}">
-                <a16:creationId xmlns:a16="http://schemas.microsoft.com/office/drawing/2014/main" id="{5E30A65B-6054-485B-9CED-FD21D466036B}"/>
-              </a:ext>
-            </a:extLst>
-          </p:cNvPr>
-          <p:cNvSpPr txBox="1"/>
-          <p:nvPr/>
-        </p:nvSpPr>
-        <p:spPr>
-          <a:xfrm>
-            <a:off x="6915003" y="3947777"/>
-            <a:ext cx="258404" cy="261610"/>
-          </a:xfrm>
-          <a:prstGeom prst="rect">
-            <a:avLst/>
-          </a:prstGeom>
-          <a:noFill/>
-        </p:spPr>
-        <p:txBody>
-          <a:bodyPr wrap="none" rtlCol="0">
-            <a:spAutoFit/>
-          </a:bodyPr>
-          <a:lstStyle/>
-          <a:p>
-            <a:r>
-              <a:rPr lang="en-SG" sz="1100" dirty="0">
-                <a:solidFill>
-                  <a:srgbClr val="002060"/>
-                </a:solidFill>
-              </a:rPr>
-              <a:t>X</a:t>
-            </a:r>
-          </a:p>
-        </p:txBody>
-      </p:sp>
     </p:spTree>
     <p:extLst>
       <p:ext uri="{BB962C8B-B14F-4D97-AF65-F5344CB8AC3E}">

</xml_diff>